<commit_message>
reviewed draft results file
</commit_message>
<xml_diff>
--- a/Results/Enhancing Circular Agriculture - ECA.pptx
+++ b/Results/Enhancing Circular Agriculture - ECA.pptx
@@ -7,6 +7,7 @@
   <p:sldIdLst>
     <p:sldId id="256" r:id="rId2"/>
     <p:sldId id="257" r:id="rId3"/>
+    <p:sldId id="258" r:id="rId4"/>
   </p:sldIdLst>
   <p:sldSz cx="12192000" cy="6858000"/>
   <p:notesSz cx="6858000" cy="9144000"/>
@@ -5252,10 +5253,10 @@
       </p:sp>
       <p:sp>
         <p:nvSpPr>
-          <p:cNvPr id="3" name="Content Placeholder 2">
+          <p:cNvPr id="9" name="Content Placeholder 8">
             <a:extLst>
               <a:ext uri="{FF2B5EF4-FFF2-40B4-BE49-F238E27FC236}">
-                <a16:creationId xmlns:a16="http://schemas.microsoft.com/office/drawing/2014/main" id="{E332F696-E4D4-32D6-956F-395EE159FB0A}"/>
+                <a16:creationId xmlns:a16="http://schemas.microsoft.com/office/drawing/2014/main" id="{D4FFE37F-B163-CED1-0679-F10FA9580F4F}"/>
               </a:ext>
             </a:extLst>
           </p:cNvPr>
@@ -5271,7 +5272,7 @@
           <a:bodyPr/>
           <a:lstStyle/>
           <a:p>
-            <a:endParaRPr lang="en-US"/>
+            <a:endParaRPr lang="en-GB"/>
           </a:p>
         </p:txBody>
       </p:sp>
@@ -5279,6 +5280,94 @@
     <p:extLst>
       <p:ext uri="{BB962C8B-B14F-4D97-AF65-F5344CB8AC3E}">
         <p14:creationId xmlns:p14="http://schemas.microsoft.com/office/powerpoint/2010/main" val="1061617416"/>
+      </p:ext>
+    </p:extLst>
+  </p:cSld>
+  <p:clrMapOvr>
+    <a:masterClrMapping/>
+  </p:clrMapOvr>
+</p:sld>
+</file>
+
+<file path=ppt/slides/slide3.xml><?xml version="1.0" encoding="utf-8"?>
+<p:sld xmlns:a="http://schemas.openxmlformats.org/drawingml/2006/main" xmlns:r="http://schemas.openxmlformats.org/officeDocument/2006/relationships" xmlns:p="http://schemas.openxmlformats.org/presentationml/2006/main">
+  <p:cSld>
+    <p:spTree>
+      <p:nvGrpSpPr>
+        <p:cNvPr id="1" name=""/>
+        <p:cNvGrpSpPr/>
+        <p:nvPr/>
+      </p:nvGrpSpPr>
+      <p:grpSpPr>
+        <a:xfrm>
+          <a:off x="0" y="0"/>
+          <a:ext cx="0" cy="0"/>
+          <a:chOff x="0" y="0"/>
+          <a:chExt cx="0" cy="0"/>
+        </a:xfrm>
+      </p:grpSpPr>
+      <p:pic>
+        <p:nvPicPr>
+          <p:cNvPr id="2" name="Picture 1" descr="Background pattern&#10;&#10;Description automatically generated">
+            <a:extLst>
+              <a:ext uri="{FF2B5EF4-FFF2-40B4-BE49-F238E27FC236}">
+                <a16:creationId xmlns:a16="http://schemas.microsoft.com/office/drawing/2014/main" id="{BC9C0DB9-71D3-DD65-4A13-5DA8010B2CF7}"/>
+              </a:ext>
+            </a:extLst>
+          </p:cNvPr>
+          <p:cNvPicPr>
+            <a:picLocks noChangeAspect="1"/>
+          </p:cNvPicPr>
+          <p:nvPr/>
+        </p:nvPicPr>
+        <p:blipFill rotWithShape="1">
+          <a:blip r:embed="rId2"/>
+          <a:srcRect b="50276"/>
+          <a:stretch/>
+        </p:blipFill>
+        <p:spPr>
+          <a:xfrm>
+            <a:off x="5604949" y="-1"/>
+            <a:ext cx="6587052" cy="3275317"/>
+          </a:xfrm>
+          <a:prstGeom prst="rect">
+            <a:avLst/>
+          </a:prstGeom>
+        </p:spPr>
+      </p:pic>
+      <p:pic>
+        <p:nvPicPr>
+          <p:cNvPr id="3" name="Picture 2" descr="Background pattern&#10;&#10;Description automatically generated">
+            <a:extLst>
+              <a:ext uri="{FF2B5EF4-FFF2-40B4-BE49-F238E27FC236}">
+                <a16:creationId xmlns:a16="http://schemas.microsoft.com/office/drawing/2014/main" id="{265574BD-A0DE-1B14-E015-CCDEF59586AD}"/>
+              </a:ext>
+            </a:extLst>
+          </p:cNvPr>
+          <p:cNvPicPr>
+            <a:picLocks noChangeAspect="1"/>
+          </p:cNvPicPr>
+          <p:nvPr/>
+        </p:nvPicPr>
+        <p:blipFill rotWithShape="1">
+          <a:blip r:embed="rId2"/>
+          <a:srcRect t="47812"/>
+          <a:stretch/>
+        </p:blipFill>
+        <p:spPr>
+          <a:xfrm>
+            <a:off x="0" y="3275317"/>
+            <a:ext cx="6864981" cy="3582683"/>
+          </a:xfrm>
+          <a:prstGeom prst="rect">
+            <a:avLst/>
+          </a:prstGeom>
+        </p:spPr>
+      </p:pic>
+    </p:spTree>
+    <p:extLst>
+      <p:ext uri="{BB962C8B-B14F-4D97-AF65-F5344CB8AC3E}">
+        <p14:creationId xmlns:p14="http://schemas.microsoft.com/office/powerpoint/2010/main" val="3523796298"/>
       </p:ext>
     </p:extLst>
   </p:cSld>

</xml_diff>